<commit_message>
Updated User and Dev guide. Fixed Security Issues
Removed password from appearing in the logs.
</commit_message>
<xml_diff>
--- a/docs/diagrams/ModelComponentClassDiagram.pptx
+++ b/docs/diagrams/ModelComponentClassDiagram.pptx
@@ -126,6 +126,10 @@
 </p:presentation>
 </file>
 
+<file path=ppt/revisionInfo.xml><?xml version="1.0" encoding="utf-8"?>
+<p1510:revInfo xmlns:a="http://schemas.openxmlformats.org/drawingml/2006/main" xmlns:r="http://schemas.openxmlformats.org/officeDocument/2006/relationships" xmlns:p1510="http://schemas.microsoft.com/office/powerpoint/2015/10/main"/>
+</file>
+
 <file path=ppt/notesMasters/notesMaster1.xml><?xml version="1.0" encoding="utf-8"?>
 <p:notesMaster xmlns:a="http://schemas.openxmlformats.org/drawingml/2006/main" xmlns:r="http://schemas.openxmlformats.org/officeDocument/2006/relationships" xmlns:p="http://schemas.openxmlformats.org/presentationml/2006/main">
   <p:cSld>
@@ -208,7 +212,7 @@
           <a:p>
             <a:fld id="{F5CC4B3F-88C1-4FFA-B1B6-F41C21DC6924}" type="datetimeFigureOut">
               <a:rPr lang="en-US" smtClean="0"/>
-              <a:t>9/4/17</a:t>
+              <a:t>12-Nov-17</a:t>
             </a:fld>
             <a:endParaRPr lang="en-US"/>
           </a:p>
@@ -272,38 +276,37 @@
           <a:p>
             <a:pPr lvl="0"/>
             <a:r>
-              <a:rPr lang="en-US" smtClean="0"/>
+              <a:rPr lang="en-US"/>
               <a:t>Click to edit Master text styles</a:t>
             </a:r>
           </a:p>
           <a:p>
             <a:pPr lvl="1"/>
             <a:r>
-              <a:rPr lang="en-US" smtClean="0"/>
+              <a:rPr lang="en-US"/>
               <a:t>Second level</a:t>
             </a:r>
           </a:p>
           <a:p>
             <a:pPr lvl="2"/>
             <a:r>
-              <a:rPr lang="en-US" smtClean="0"/>
+              <a:rPr lang="en-US"/>
               <a:t>Third level</a:t>
             </a:r>
           </a:p>
           <a:p>
             <a:pPr lvl="3"/>
             <a:r>
-              <a:rPr lang="en-US" smtClean="0"/>
+              <a:rPr lang="en-US"/>
               <a:t>Fourth level</a:t>
             </a:r>
           </a:p>
           <a:p>
             <a:pPr lvl="4"/>
             <a:r>
-              <a:rPr lang="en-US" smtClean="0"/>
+              <a:rPr lang="en-US"/>
               <a:t>Fifth level</a:t>
             </a:r>
-            <a:endParaRPr lang="en-US"/>
           </a:p>
         </p:txBody>
       </p:sp>
@@ -514,10 +517,9 @@
           <a:lstStyle/>
           <a:p>
             <a:r>
-              <a:rPr lang="en-US" smtClean="0"/>
+              <a:rPr lang="en-US"/>
               <a:t>Click to edit Master title style</a:t>
             </a:r>
-            <a:endParaRPr lang="en-US"/>
           </a:p>
         </p:txBody>
       </p:sp>
@@ -633,10 +635,9 @@
           </a:lstStyle>
           <a:p>
             <a:r>
-              <a:rPr lang="en-US" smtClean="0"/>
+              <a:rPr lang="en-US"/>
               <a:t>Click to edit Master subtitle style</a:t>
             </a:r>
-            <a:endParaRPr lang="en-US"/>
           </a:p>
         </p:txBody>
       </p:sp>
@@ -657,7 +658,7 @@
           <a:p>
             <a:fld id="{78C97017-6FC3-485B-9764-EAC9E56C1D49}" type="datetimeFigureOut">
               <a:rPr lang="en-US" smtClean="0"/>
-              <a:t>9/4/17</a:t>
+              <a:t>12-Nov-17</a:t>
             </a:fld>
             <a:endParaRPr lang="en-US"/>
           </a:p>
@@ -751,10 +752,9 @@
           <a:lstStyle/>
           <a:p>
             <a:r>
-              <a:rPr lang="en-US" smtClean="0"/>
+              <a:rPr lang="en-US"/>
               <a:t>Click to edit Master title style</a:t>
             </a:r>
-            <a:endParaRPr lang="en-US"/>
           </a:p>
         </p:txBody>
       </p:sp>
@@ -775,38 +775,37 @@
           <a:p>
             <a:pPr lvl="0"/>
             <a:r>
-              <a:rPr lang="en-US" smtClean="0"/>
+              <a:rPr lang="en-US"/>
               <a:t>Click to edit Master text styles</a:t>
             </a:r>
           </a:p>
           <a:p>
             <a:pPr lvl="1"/>
             <a:r>
-              <a:rPr lang="en-US" smtClean="0"/>
+              <a:rPr lang="en-US"/>
               <a:t>Second level</a:t>
             </a:r>
           </a:p>
           <a:p>
             <a:pPr lvl="2"/>
             <a:r>
-              <a:rPr lang="en-US" smtClean="0"/>
+              <a:rPr lang="en-US"/>
               <a:t>Third level</a:t>
             </a:r>
           </a:p>
           <a:p>
             <a:pPr lvl="3"/>
             <a:r>
-              <a:rPr lang="en-US" smtClean="0"/>
+              <a:rPr lang="en-US"/>
               <a:t>Fourth level</a:t>
             </a:r>
           </a:p>
           <a:p>
             <a:pPr lvl="4"/>
             <a:r>
-              <a:rPr lang="en-US" smtClean="0"/>
+              <a:rPr lang="en-US"/>
               <a:t>Fifth level</a:t>
             </a:r>
-            <a:endParaRPr lang="en-US"/>
           </a:p>
         </p:txBody>
       </p:sp>
@@ -827,7 +826,7 @@
           <a:p>
             <a:fld id="{78C97017-6FC3-485B-9764-EAC9E56C1D49}" type="datetimeFigureOut">
               <a:rPr lang="en-US" smtClean="0"/>
-              <a:t>9/4/17</a:t>
+              <a:t>12-Nov-17</a:t>
             </a:fld>
             <a:endParaRPr lang="en-US"/>
           </a:p>
@@ -926,10 +925,9 @@
           <a:lstStyle/>
           <a:p>
             <a:r>
-              <a:rPr lang="en-US" smtClean="0"/>
+              <a:rPr lang="en-US"/>
               <a:t>Click to edit Master title style</a:t>
             </a:r>
-            <a:endParaRPr lang="en-US"/>
           </a:p>
         </p:txBody>
       </p:sp>
@@ -955,38 +953,37 @@
           <a:p>
             <a:pPr lvl="0"/>
             <a:r>
-              <a:rPr lang="en-US" smtClean="0"/>
+              <a:rPr lang="en-US"/>
               <a:t>Click to edit Master text styles</a:t>
             </a:r>
           </a:p>
           <a:p>
             <a:pPr lvl="1"/>
             <a:r>
-              <a:rPr lang="en-US" smtClean="0"/>
+              <a:rPr lang="en-US"/>
               <a:t>Second level</a:t>
             </a:r>
           </a:p>
           <a:p>
             <a:pPr lvl="2"/>
             <a:r>
-              <a:rPr lang="en-US" smtClean="0"/>
+              <a:rPr lang="en-US"/>
               <a:t>Third level</a:t>
             </a:r>
           </a:p>
           <a:p>
             <a:pPr lvl="3"/>
             <a:r>
-              <a:rPr lang="en-US" smtClean="0"/>
+              <a:rPr lang="en-US"/>
               <a:t>Fourth level</a:t>
             </a:r>
           </a:p>
           <a:p>
             <a:pPr lvl="4"/>
             <a:r>
-              <a:rPr lang="en-US" smtClean="0"/>
+              <a:rPr lang="en-US"/>
               <a:t>Fifth level</a:t>
             </a:r>
-            <a:endParaRPr lang="en-US"/>
           </a:p>
         </p:txBody>
       </p:sp>
@@ -1007,7 +1004,7 @@
           <a:p>
             <a:fld id="{78C97017-6FC3-485B-9764-EAC9E56C1D49}" type="datetimeFigureOut">
               <a:rPr lang="en-US" smtClean="0"/>
-              <a:t>9/4/17</a:t>
+              <a:t>12-Nov-17</a:t>
             </a:fld>
             <a:endParaRPr lang="en-US"/>
           </a:p>
@@ -1101,10 +1098,9 @@
           <a:lstStyle/>
           <a:p>
             <a:r>
-              <a:rPr lang="en-US" smtClean="0"/>
+              <a:rPr lang="en-US"/>
               <a:t>Click to edit Master title style</a:t>
             </a:r>
-            <a:endParaRPr lang="en-US"/>
           </a:p>
         </p:txBody>
       </p:sp>
@@ -1125,38 +1121,37 @@
           <a:p>
             <a:pPr lvl="0"/>
             <a:r>
-              <a:rPr lang="en-US" smtClean="0"/>
+              <a:rPr lang="en-US"/>
               <a:t>Click to edit Master text styles</a:t>
             </a:r>
           </a:p>
           <a:p>
             <a:pPr lvl="1"/>
             <a:r>
-              <a:rPr lang="en-US" smtClean="0"/>
+              <a:rPr lang="en-US"/>
               <a:t>Second level</a:t>
             </a:r>
           </a:p>
           <a:p>
             <a:pPr lvl="2"/>
             <a:r>
-              <a:rPr lang="en-US" smtClean="0"/>
+              <a:rPr lang="en-US"/>
               <a:t>Third level</a:t>
             </a:r>
           </a:p>
           <a:p>
             <a:pPr lvl="3"/>
             <a:r>
-              <a:rPr lang="en-US" smtClean="0"/>
+              <a:rPr lang="en-US"/>
               <a:t>Fourth level</a:t>
             </a:r>
           </a:p>
           <a:p>
             <a:pPr lvl="4"/>
             <a:r>
-              <a:rPr lang="en-US" smtClean="0"/>
+              <a:rPr lang="en-US"/>
               <a:t>Fifth level</a:t>
             </a:r>
-            <a:endParaRPr lang="en-US"/>
           </a:p>
         </p:txBody>
       </p:sp>
@@ -1177,7 +1172,7 @@
           <a:p>
             <a:fld id="{78C97017-6FC3-485B-9764-EAC9E56C1D49}" type="datetimeFigureOut">
               <a:rPr lang="en-US" smtClean="0"/>
-              <a:t>9/4/17</a:t>
+              <a:t>12-Nov-17</a:t>
             </a:fld>
             <a:endParaRPr lang="en-US"/>
           </a:p>
@@ -1280,10 +1275,9 @@
           </a:lstStyle>
           <a:p>
             <a:r>
-              <a:rPr lang="en-US" smtClean="0"/>
+              <a:rPr lang="en-US"/>
               <a:t>Click to edit Master title style</a:t>
             </a:r>
-            <a:endParaRPr lang="en-US"/>
           </a:p>
         </p:txBody>
       </p:sp>
@@ -1400,7 +1394,7 @@
           <a:p>
             <a:pPr lvl="0"/>
             <a:r>
-              <a:rPr lang="en-US" smtClean="0"/>
+              <a:rPr lang="en-US"/>
               <a:t>Click to edit Master text styles</a:t>
             </a:r>
           </a:p>
@@ -1423,7 +1417,7 @@
           <a:p>
             <a:fld id="{78C97017-6FC3-485B-9764-EAC9E56C1D49}" type="datetimeFigureOut">
               <a:rPr lang="en-US" smtClean="0"/>
-              <a:t>9/4/17</a:t>
+              <a:t>12-Nov-17</a:t>
             </a:fld>
             <a:endParaRPr lang="en-US"/>
           </a:p>
@@ -1517,10 +1511,9 @@
           <a:lstStyle/>
           <a:p>
             <a:r>
-              <a:rPr lang="en-US" smtClean="0"/>
+              <a:rPr lang="en-US"/>
               <a:t>Click to edit Master title style</a:t>
             </a:r>
-            <a:endParaRPr lang="en-US"/>
           </a:p>
         </p:txBody>
       </p:sp>
@@ -1574,38 +1567,37 @@
           <a:p>
             <a:pPr lvl="0"/>
             <a:r>
-              <a:rPr lang="en-US" smtClean="0"/>
+              <a:rPr lang="en-US"/>
               <a:t>Click to edit Master text styles</a:t>
             </a:r>
           </a:p>
           <a:p>
             <a:pPr lvl="1"/>
             <a:r>
-              <a:rPr lang="en-US" smtClean="0"/>
+              <a:rPr lang="en-US"/>
               <a:t>Second level</a:t>
             </a:r>
           </a:p>
           <a:p>
             <a:pPr lvl="2"/>
             <a:r>
-              <a:rPr lang="en-US" smtClean="0"/>
+              <a:rPr lang="en-US"/>
               <a:t>Third level</a:t>
             </a:r>
           </a:p>
           <a:p>
             <a:pPr lvl="3"/>
             <a:r>
-              <a:rPr lang="en-US" smtClean="0"/>
+              <a:rPr lang="en-US"/>
               <a:t>Fourth level</a:t>
             </a:r>
           </a:p>
           <a:p>
             <a:pPr lvl="4"/>
             <a:r>
-              <a:rPr lang="en-US" smtClean="0"/>
+              <a:rPr lang="en-US"/>
               <a:t>Fifth level</a:t>
             </a:r>
-            <a:endParaRPr lang="en-US"/>
           </a:p>
         </p:txBody>
       </p:sp>
@@ -1659,38 +1651,37 @@
           <a:p>
             <a:pPr lvl="0"/>
             <a:r>
-              <a:rPr lang="en-US" smtClean="0"/>
+              <a:rPr lang="en-US"/>
               <a:t>Click to edit Master text styles</a:t>
             </a:r>
           </a:p>
           <a:p>
             <a:pPr lvl="1"/>
             <a:r>
-              <a:rPr lang="en-US" smtClean="0"/>
+              <a:rPr lang="en-US"/>
               <a:t>Second level</a:t>
             </a:r>
           </a:p>
           <a:p>
             <a:pPr lvl="2"/>
             <a:r>
-              <a:rPr lang="en-US" smtClean="0"/>
+              <a:rPr lang="en-US"/>
               <a:t>Third level</a:t>
             </a:r>
           </a:p>
           <a:p>
             <a:pPr lvl="3"/>
             <a:r>
-              <a:rPr lang="en-US" smtClean="0"/>
+              <a:rPr lang="en-US"/>
               <a:t>Fourth level</a:t>
             </a:r>
           </a:p>
           <a:p>
             <a:pPr lvl="4"/>
             <a:r>
-              <a:rPr lang="en-US" smtClean="0"/>
+              <a:rPr lang="en-US"/>
               <a:t>Fifth level</a:t>
             </a:r>
-            <a:endParaRPr lang="en-US"/>
           </a:p>
         </p:txBody>
       </p:sp>
@@ -1711,7 +1702,7 @@
           <a:p>
             <a:fld id="{78C97017-6FC3-485B-9764-EAC9E56C1D49}" type="datetimeFigureOut">
               <a:rPr lang="en-US" smtClean="0"/>
-              <a:t>9/4/17</a:t>
+              <a:t>12-Nov-17</a:t>
             </a:fld>
             <a:endParaRPr lang="en-US"/>
           </a:p>
@@ -1809,10 +1800,9 @@
           </a:lstStyle>
           <a:p>
             <a:r>
-              <a:rPr lang="en-US" smtClean="0"/>
+              <a:rPr lang="en-US"/>
               <a:t>Click to edit Master title style</a:t>
             </a:r>
-            <a:endParaRPr lang="en-US"/>
           </a:p>
         </p:txBody>
       </p:sp>
@@ -1875,7 +1865,7 @@
           <a:p>
             <a:pPr lvl="0"/>
             <a:r>
-              <a:rPr lang="en-US" smtClean="0"/>
+              <a:rPr lang="en-US"/>
               <a:t>Click to edit Master text styles</a:t>
             </a:r>
           </a:p>
@@ -1931,38 +1921,37 @@
           <a:p>
             <a:pPr lvl="0"/>
             <a:r>
-              <a:rPr lang="en-US" smtClean="0"/>
+              <a:rPr lang="en-US"/>
               <a:t>Click to edit Master text styles</a:t>
             </a:r>
           </a:p>
           <a:p>
             <a:pPr lvl="1"/>
             <a:r>
-              <a:rPr lang="en-US" smtClean="0"/>
+              <a:rPr lang="en-US"/>
               <a:t>Second level</a:t>
             </a:r>
           </a:p>
           <a:p>
             <a:pPr lvl="2"/>
             <a:r>
-              <a:rPr lang="en-US" smtClean="0"/>
+              <a:rPr lang="en-US"/>
               <a:t>Third level</a:t>
             </a:r>
           </a:p>
           <a:p>
             <a:pPr lvl="3"/>
             <a:r>
-              <a:rPr lang="en-US" smtClean="0"/>
+              <a:rPr lang="en-US"/>
               <a:t>Fourth level</a:t>
             </a:r>
           </a:p>
           <a:p>
             <a:pPr lvl="4"/>
             <a:r>
-              <a:rPr lang="en-US" smtClean="0"/>
+              <a:rPr lang="en-US"/>
               <a:t>Fifth level</a:t>
             </a:r>
-            <a:endParaRPr lang="en-US"/>
           </a:p>
         </p:txBody>
       </p:sp>
@@ -2025,7 +2014,7 @@
           <a:p>
             <a:pPr lvl="0"/>
             <a:r>
-              <a:rPr lang="en-US" smtClean="0"/>
+              <a:rPr lang="en-US"/>
               <a:t>Click to edit Master text styles</a:t>
             </a:r>
           </a:p>
@@ -2081,38 +2070,37 @@
           <a:p>
             <a:pPr lvl="0"/>
             <a:r>
-              <a:rPr lang="en-US" smtClean="0"/>
+              <a:rPr lang="en-US"/>
               <a:t>Click to edit Master text styles</a:t>
             </a:r>
           </a:p>
           <a:p>
             <a:pPr lvl="1"/>
             <a:r>
-              <a:rPr lang="en-US" smtClean="0"/>
+              <a:rPr lang="en-US"/>
               <a:t>Second level</a:t>
             </a:r>
           </a:p>
           <a:p>
             <a:pPr lvl="2"/>
             <a:r>
-              <a:rPr lang="en-US" smtClean="0"/>
+              <a:rPr lang="en-US"/>
               <a:t>Third level</a:t>
             </a:r>
           </a:p>
           <a:p>
             <a:pPr lvl="3"/>
             <a:r>
-              <a:rPr lang="en-US" smtClean="0"/>
+              <a:rPr lang="en-US"/>
               <a:t>Fourth level</a:t>
             </a:r>
           </a:p>
           <a:p>
             <a:pPr lvl="4"/>
             <a:r>
-              <a:rPr lang="en-US" smtClean="0"/>
+              <a:rPr lang="en-US"/>
               <a:t>Fifth level</a:t>
             </a:r>
-            <a:endParaRPr lang="en-US"/>
           </a:p>
         </p:txBody>
       </p:sp>
@@ -2133,7 +2121,7 @@
           <a:p>
             <a:fld id="{78C97017-6FC3-485B-9764-EAC9E56C1D49}" type="datetimeFigureOut">
               <a:rPr lang="en-US" smtClean="0"/>
-              <a:t>9/4/17</a:t>
+              <a:t>12-Nov-17</a:t>
             </a:fld>
             <a:endParaRPr lang="en-US"/>
           </a:p>
@@ -2227,10 +2215,9 @@
           <a:lstStyle/>
           <a:p>
             <a:r>
-              <a:rPr lang="en-US" smtClean="0"/>
+              <a:rPr lang="en-US"/>
               <a:t>Click to edit Master title style</a:t>
             </a:r>
-            <a:endParaRPr lang="en-US"/>
           </a:p>
         </p:txBody>
       </p:sp>
@@ -2251,7 +2238,7 @@
           <a:p>
             <a:fld id="{78C97017-6FC3-485B-9764-EAC9E56C1D49}" type="datetimeFigureOut">
               <a:rPr lang="en-US" smtClean="0"/>
-              <a:t>9/4/17</a:t>
+              <a:t>12-Nov-17</a:t>
             </a:fld>
             <a:endParaRPr lang="en-US"/>
           </a:p>
@@ -2346,7 +2333,7 @@
           <a:p>
             <a:fld id="{78C97017-6FC3-485B-9764-EAC9E56C1D49}" type="datetimeFigureOut">
               <a:rPr lang="en-US" smtClean="0"/>
-              <a:t>9/4/17</a:t>
+              <a:t>12-Nov-17</a:t>
             </a:fld>
             <a:endParaRPr lang="en-US"/>
           </a:p>
@@ -2449,10 +2436,9 @@
           </a:lstStyle>
           <a:p>
             <a:r>
-              <a:rPr lang="en-US" smtClean="0"/>
+              <a:rPr lang="en-US"/>
               <a:t>Click to edit Master title style</a:t>
             </a:r>
-            <a:endParaRPr lang="en-US"/>
           </a:p>
         </p:txBody>
       </p:sp>
@@ -2506,38 +2492,37 @@
           <a:p>
             <a:pPr lvl="0"/>
             <a:r>
-              <a:rPr lang="en-US" smtClean="0"/>
+              <a:rPr lang="en-US"/>
               <a:t>Click to edit Master text styles</a:t>
             </a:r>
           </a:p>
           <a:p>
             <a:pPr lvl="1"/>
             <a:r>
-              <a:rPr lang="en-US" smtClean="0"/>
+              <a:rPr lang="en-US"/>
               <a:t>Second level</a:t>
             </a:r>
           </a:p>
           <a:p>
             <a:pPr lvl="2"/>
             <a:r>
-              <a:rPr lang="en-US" smtClean="0"/>
+              <a:rPr lang="en-US"/>
               <a:t>Third level</a:t>
             </a:r>
           </a:p>
           <a:p>
             <a:pPr lvl="3"/>
             <a:r>
-              <a:rPr lang="en-US" smtClean="0"/>
+              <a:rPr lang="en-US"/>
               <a:t>Fourth level</a:t>
             </a:r>
           </a:p>
           <a:p>
             <a:pPr lvl="4"/>
             <a:r>
-              <a:rPr lang="en-US" smtClean="0"/>
+              <a:rPr lang="en-US"/>
               <a:t>Fifth level</a:t>
             </a:r>
-            <a:endParaRPr lang="en-US"/>
           </a:p>
         </p:txBody>
       </p:sp>
@@ -2600,7 +2585,7 @@
           <a:p>
             <a:pPr lvl="0"/>
             <a:r>
-              <a:rPr lang="en-US" smtClean="0"/>
+              <a:rPr lang="en-US"/>
               <a:t>Click to edit Master text styles</a:t>
             </a:r>
           </a:p>
@@ -2623,7 +2608,7 @@
           <a:p>
             <a:fld id="{78C97017-6FC3-485B-9764-EAC9E56C1D49}" type="datetimeFigureOut">
               <a:rPr lang="en-US" smtClean="0"/>
-              <a:t>9/4/17</a:t>
+              <a:t>12-Nov-17</a:t>
             </a:fld>
             <a:endParaRPr lang="en-US"/>
           </a:p>
@@ -2726,10 +2711,9 @@
           </a:lstStyle>
           <a:p>
             <a:r>
-              <a:rPr lang="en-US" smtClean="0"/>
+              <a:rPr lang="en-US"/>
               <a:t>Click to edit Master title style</a:t>
             </a:r>
-            <a:endParaRPr lang="en-US"/>
           </a:p>
         </p:txBody>
       </p:sp>
@@ -2853,7 +2837,7 @@
           <a:p>
             <a:pPr lvl="0"/>
             <a:r>
-              <a:rPr lang="en-US" smtClean="0"/>
+              <a:rPr lang="en-US"/>
               <a:t>Click to edit Master text styles</a:t>
             </a:r>
           </a:p>
@@ -2876,7 +2860,7 @@
           <a:p>
             <a:fld id="{78C97017-6FC3-485B-9764-EAC9E56C1D49}" type="datetimeFigureOut">
               <a:rPr lang="en-US" smtClean="0"/>
-              <a:t>9/4/17</a:t>
+              <a:t>12-Nov-17</a:t>
             </a:fld>
             <a:endParaRPr lang="en-US"/>
           </a:p>
@@ -2985,10 +2969,9 @@
           <a:lstStyle/>
           <a:p>
             <a:r>
-              <a:rPr lang="en-US" smtClean="0"/>
+              <a:rPr lang="en-US"/>
               <a:t>Click to edit Master title style</a:t>
             </a:r>
-            <a:endParaRPr lang="en-US"/>
           </a:p>
         </p:txBody>
       </p:sp>
@@ -3019,38 +3002,37 @@
           <a:p>
             <a:pPr lvl="0"/>
             <a:r>
-              <a:rPr lang="en-US" smtClean="0"/>
+              <a:rPr lang="en-US"/>
               <a:t>Click to edit Master text styles</a:t>
             </a:r>
           </a:p>
           <a:p>
             <a:pPr lvl="1"/>
             <a:r>
-              <a:rPr lang="en-US" smtClean="0"/>
+              <a:rPr lang="en-US"/>
               <a:t>Second level</a:t>
             </a:r>
           </a:p>
           <a:p>
             <a:pPr lvl="2"/>
             <a:r>
-              <a:rPr lang="en-US" smtClean="0"/>
+              <a:rPr lang="en-US"/>
               <a:t>Third level</a:t>
             </a:r>
           </a:p>
           <a:p>
             <a:pPr lvl="3"/>
             <a:r>
-              <a:rPr lang="en-US" smtClean="0"/>
+              <a:rPr lang="en-US"/>
               <a:t>Fourth level</a:t>
             </a:r>
           </a:p>
           <a:p>
             <a:pPr lvl="4"/>
             <a:r>
-              <a:rPr lang="en-US" smtClean="0"/>
+              <a:rPr lang="en-US"/>
               <a:t>Fifth level</a:t>
             </a:r>
-            <a:endParaRPr lang="en-US"/>
           </a:p>
         </p:txBody>
       </p:sp>
@@ -3089,7 +3071,7 @@
           <a:p>
             <a:fld id="{78C97017-6FC3-485B-9764-EAC9E56C1D49}" type="datetimeFigureOut">
               <a:rPr lang="en-US" smtClean="0"/>
-              <a:t>9/4/17</a:t>
+              <a:t>12-Nov-17</a:t>
             </a:fld>
             <a:endParaRPr lang="en-US"/>
           </a:p>
@@ -3472,8 +3454,8 @@
         </p:nvSpPr>
         <p:spPr>
           <a:xfrm>
-            <a:off x="1119865" y="1727200"/>
-            <a:ext cx="7490735" cy="2997200"/>
+            <a:off x="1119865" y="468640"/>
+            <a:ext cx="7719335" cy="4789160"/>
           </a:xfrm>
           <a:prstGeom prst="roundRect">
             <a:avLst>
@@ -3510,7 +3492,7 @@
           <a:lstStyle/>
           <a:p>
             <a:r>
-              <a:rPr lang="en-US" sz="1200" b="1" dirty="0" smtClean="0">
+              <a:rPr lang="en-US" sz="1200" b="1" dirty="0">
                 <a:solidFill>
                   <a:srgbClr val="7030A0"/>
                 </a:solidFill>
@@ -3569,7 +3551,7 @@
           <a:p>
             <a:pPr algn="ctr"/>
             <a:r>
-              <a:rPr lang="en-US" sz="1050" dirty="0" err="1" smtClean="0">
+              <a:rPr lang="en-US" sz="1050" dirty="0" err="1">
                 <a:solidFill>
                   <a:schemeClr val="bg1"/>
                 </a:solidFill>
@@ -3628,7 +3610,7 @@
           <a:p>
             <a:pPr algn="ctr"/>
             <a:r>
-              <a:rPr lang="en-US" sz="1050" dirty="0" err="1" smtClean="0">
+              <a:rPr lang="en-US" sz="1050" dirty="0" err="1">
                 <a:solidFill>
                   <a:schemeClr val="bg1"/>
                 </a:solidFill>
@@ -3783,7 +3765,7 @@
           <a:p>
             <a:pPr algn="ctr"/>
             <a:r>
-              <a:rPr lang="en-US" sz="1050" dirty="0" smtClean="0">
+              <a:rPr lang="en-US" sz="1050" dirty="0">
                 <a:solidFill>
                   <a:schemeClr val="bg1"/>
                 </a:solidFill>
@@ -4107,7 +4089,7 @@
           <a:p>
             <a:pPr algn="ctr"/>
             <a:r>
-              <a:rPr lang="en-US" sz="1050" dirty="0" err="1" smtClean="0">
+              <a:rPr lang="en-US" sz="1050" dirty="0" err="1">
                 <a:solidFill>
                   <a:srgbClr val="7030A0"/>
                 </a:solidFill>
@@ -4249,7 +4231,7 @@
           <a:p>
             <a:pPr algn="ctr"/>
             <a:r>
-              <a:rPr lang="en-US" sz="1050" dirty="0" err="1" smtClean="0">
+              <a:rPr lang="en-US" sz="1050" dirty="0" err="1">
                 <a:solidFill>
                   <a:srgbClr val="7030A0"/>
                 </a:solidFill>
@@ -4393,7 +4375,7 @@
           <a:p>
             <a:pPr algn="ctr"/>
             <a:r>
-              <a:rPr lang="en-US" sz="1050" dirty="0" err="1" smtClean="0">
+              <a:rPr lang="en-US" sz="1050" dirty="0" err="1">
                 <a:solidFill>
                   <a:srgbClr val="7030A0"/>
                 </a:solidFill>
@@ -4492,7 +4474,7 @@
           <a:p>
             <a:pPr algn="ctr"/>
             <a:r>
-              <a:rPr lang="en-US" sz="1050" dirty="0" smtClean="0">
+              <a:rPr lang="en-US" sz="1050" dirty="0">
                 <a:solidFill>
                   <a:srgbClr val="7030A0"/>
                 </a:solidFill>
@@ -4634,7 +4616,7 @@
           <a:p>
             <a:pPr algn="ctr"/>
             <a:r>
-              <a:rPr lang="en-US" sz="1050" dirty="0" smtClean="0">
+              <a:rPr lang="en-US" sz="1050" dirty="0">
                 <a:solidFill>
                   <a:srgbClr val="7030A0"/>
                 </a:solidFill>
@@ -4776,7 +4758,7 @@
           <a:p>
             <a:pPr algn="ctr"/>
             <a:r>
-              <a:rPr lang="en-US" sz="1050" dirty="0" smtClean="0">
+              <a:rPr lang="en-US" sz="1050" dirty="0">
                 <a:solidFill>
                   <a:srgbClr val="7030A0"/>
                 </a:solidFill>
@@ -4784,14 +4766,14 @@
               <a:t>&lt;&lt;interface&gt;&gt;</a:t>
             </a:r>
             <a:br>
-              <a:rPr lang="en-US" sz="1050" dirty="0" smtClean="0">
+              <a:rPr lang="en-US" sz="1050" dirty="0">
                 <a:solidFill>
                   <a:srgbClr val="7030A0"/>
                 </a:solidFill>
               </a:rPr>
             </a:br>
             <a:r>
-              <a:rPr lang="en-US" sz="1050" dirty="0" err="1" smtClean="0">
+              <a:rPr lang="en-US" sz="1050" dirty="0" err="1">
                 <a:solidFill>
                   <a:srgbClr val="7030A0"/>
                 </a:solidFill>
@@ -4814,8 +4796,8 @@
         </p:nvSpPr>
         <p:spPr>
           <a:xfrm>
-            <a:off x="7712397" y="2564238"/>
-            <a:ext cx="708186" cy="285783"/>
+            <a:off x="7712397" y="2609817"/>
+            <a:ext cx="898200" cy="285783"/>
           </a:xfrm>
           <a:prstGeom prst="rect">
             <a:avLst/>
@@ -4847,7 +4829,7 @@
           <a:p>
             <a:pPr algn="ctr"/>
             <a:r>
-              <a:rPr lang="en-US" sz="1050" dirty="0" smtClean="0">
+              <a:rPr lang="en-US" sz="1050" dirty="0">
                 <a:solidFill>
                   <a:srgbClr val="7030A0"/>
                 </a:solidFill>
@@ -4913,6 +4895,7 @@
         <p:nvCxnSpPr>
           <p:cNvPr id="79" name="Elbow Connector 78"/>
           <p:cNvCxnSpPr>
+            <a:cxnSpLocks/>
             <a:stCxn id="78" idx="3"/>
             <a:endCxn id="76" idx="1"/>
           </p:cNvCxnSpPr>
@@ -4920,8 +4903,8 @@
         </p:nvCxnSpPr>
         <p:spPr>
           <a:xfrm flipV="1">
-            <a:off x="7277995" y="2707130"/>
-            <a:ext cx="434402" cy="327761"/>
+            <a:off x="7277995" y="2752709"/>
+            <a:ext cx="434402" cy="282182"/>
           </a:xfrm>
           <a:prstGeom prst="bentConnector3">
             <a:avLst/>
@@ -4958,8 +4941,8 @@
         </p:nvSpPr>
         <p:spPr>
           <a:xfrm>
-            <a:off x="7712397" y="2887216"/>
-            <a:ext cx="708186" cy="285783"/>
+            <a:off x="7712396" y="2905760"/>
+            <a:ext cx="898201" cy="285783"/>
           </a:xfrm>
           <a:prstGeom prst="rect">
             <a:avLst/>
@@ -4991,7 +4974,7 @@
           <a:p>
             <a:pPr algn="ctr"/>
             <a:r>
-              <a:rPr lang="en-US" sz="1050" dirty="0" smtClean="0">
+              <a:rPr lang="en-US" sz="1050" dirty="0">
                 <a:solidFill>
                   <a:srgbClr val="7030A0"/>
                 </a:solidFill>
@@ -5010,15 +4993,16 @@
         <p:nvCxnSpPr>
           <p:cNvPr id="81" name="Elbow Connector 80"/>
           <p:cNvCxnSpPr>
+            <a:cxnSpLocks/>
             <a:stCxn id="78" idx="3"/>
             <a:endCxn id="80" idx="1"/>
           </p:cNvCxnSpPr>
           <p:nvPr/>
         </p:nvCxnSpPr>
         <p:spPr>
-          <a:xfrm flipV="1">
-            <a:off x="7277995" y="3030108"/>
-            <a:ext cx="434402" cy="4783"/>
+          <a:xfrm>
+            <a:off x="7277995" y="3034891"/>
+            <a:ext cx="434401" cy="13761"/>
           </a:xfrm>
           <a:prstGeom prst="bentConnector3">
             <a:avLst/>
@@ -5055,8 +5039,8 @@
         </p:nvSpPr>
         <p:spPr>
           <a:xfrm>
-            <a:off x="7712397" y="3210194"/>
-            <a:ext cx="708186" cy="285783"/>
+            <a:off x="7712396" y="3210194"/>
+            <a:ext cx="898202" cy="285783"/>
           </a:xfrm>
           <a:prstGeom prst="rect">
             <a:avLst/>
@@ -5088,7 +5072,7 @@
           <a:p>
             <a:pPr algn="ctr"/>
             <a:r>
-              <a:rPr lang="en-US" sz="1050" dirty="0" smtClean="0">
+              <a:rPr lang="en-US" sz="1050" dirty="0">
                 <a:solidFill>
                   <a:srgbClr val="7030A0"/>
                 </a:solidFill>
@@ -5107,6 +5091,7 @@
         <p:nvCxnSpPr>
           <p:cNvPr id="84" name="Elbow Connector 83"/>
           <p:cNvCxnSpPr>
+            <a:cxnSpLocks/>
             <a:stCxn id="78" idx="3"/>
             <a:endCxn id="83" idx="1"/>
           </p:cNvCxnSpPr>
@@ -5115,7 +5100,7 @@
         <p:spPr>
           <a:xfrm>
             <a:off x="7277995" y="3034891"/>
-            <a:ext cx="434402" cy="318195"/>
+            <a:ext cx="434401" cy="318195"/>
           </a:xfrm>
           <a:prstGeom prst="bentConnector3">
             <a:avLst/>
@@ -5153,7 +5138,7 @@
         <p:spPr>
           <a:xfrm>
             <a:off x="7712397" y="3533171"/>
-            <a:ext cx="708186" cy="285783"/>
+            <a:ext cx="898202" cy="285783"/>
           </a:xfrm>
           <a:prstGeom prst="rect">
             <a:avLst/>
@@ -5185,7 +5170,7 @@
           <a:p>
             <a:pPr algn="ctr"/>
             <a:r>
-              <a:rPr lang="en-US" sz="1050" dirty="0" smtClean="0">
+              <a:rPr lang="en-US" sz="1050" dirty="0">
                 <a:solidFill>
                   <a:srgbClr val="7030A0"/>
                 </a:solidFill>
@@ -5204,6 +5189,7 @@
         <p:nvCxnSpPr>
           <p:cNvPr id="86" name="Elbow Connector 85"/>
           <p:cNvCxnSpPr>
+            <a:cxnSpLocks/>
             <a:stCxn id="78" idx="3"/>
             <a:endCxn id="85" idx="1"/>
           </p:cNvCxnSpPr>
@@ -5373,7 +5359,7 @@
           <a:p>
             <a:pPr algn="ctr"/>
             <a:r>
-              <a:rPr lang="en-US" sz="1050" dirty="0" smtClean="0">
+              <a:rPr lang="en-US" sz="1050" dirty="0">
                 <a:solidFill>
                   <a:srgbClr val="7030A0"/>
                 </a:solidFill>
@@ -5381,14 +5367,14 @@
               <a:t>&lt;&lt;interface&gt;&gt;</a:t>
             </a:r>
             <a:br>
-              <a:rPr lang="en-US" sz="1050" dirty="0" smtClean="0">
+              <a:rPr lang="en-US" sz="1050" dirty="0">
                 <a:solidFill>
                   <a:srgbClr val="7030A0"/>
                 </a:solidFill>
               </a:rPr>
             </a:br>
             <a:r>
-              <a:rPr lang="en-US" sz="1050" dirty="0" err="1" smtClean="0">
+              <a:rPr lang="en-US" sz="1050" dirty="0" err="1">
                 <a:solidFill>
                   <a:srgbClr val="7030A0"/>
                 </a:solidFill>
@@ -5427,7 +5413,7 @@
           <a:p>
             <a:pPr algn="r"/>
             <a:r>
-              <a:rPr lang="en-US" sz="1100" dirty="0" smtClean="0">
+              <a:rPr lang="en-US" sz="1100" dirty="0">
                 <a:solidFill>
                   <a:srgbClr val="7030A0"/>
                 </a:solidFill>
@@ -5483,20 +5469,12 @@
           <a:p>
             <a:pPr algn="ctr"/>
             <a:r>
-              <a:rPr lang="en-US" sz="1050" dirty="0" smtClean="0">
+              <a:rPr lang="en-US" sz="1050" dirty="0">
                 <a:solidFill>
                   <a:srgbClr val="7030A0"/>
                 </a:solidFill>
               </a:rPr>
               <a:t>&lt;&lt;interface&gt;&gt;</a:t>
-            </a:r>
-            <a:r>
-              <a:rPr lang="en-US" sz="1050">
-                <a:solidFill>
-                  <a:srgbClr val="7030A0"/>
-                </a:solidFill>
-              </a:rPr>
-              <a:t/>
             </a:r>
             <a:br>
               <a:rPr lang="en-US" sz="1050">
@@ -5506,7 +5484,7 @@
               </a:rPr>
             </a:br>
             <a:r>
-              <a:rPr lang="en-US" sz="1050" dirty="0" err="1" smtClean="0">
+              <a:rPr lang="en-US" sz="1050" dirty="0" err="1">
                 <a:solidFill>
                   <a:srgbClr val="7030A0"/>
                 </a:solidFill>
@@ -5628,7 +5606,7 @@
           <a:p>
             <a:pPr algn="ctr"/>
             <a:r>
-              <a:rPr lang="en-US" sz="1100" dirty="0" smtClean="0">
+              <a:rPr lang="en-US" sz="1100" dirty="0">
                 <a:solidFill>
                   <a:srgbClr val="7030A0"/>
                 </a:solidFill>
@@ -5667,7 +5645,7 @@
           <a:p>
             <a:pPr algn="ctr"/>
             <a:r>
-              <a:rPr lang="en-US" sz="1100" dirty="0" smtClean="0">
+              <a:rPr lang="en-US" sz="1100" dirty="0">
                 <a:solidFill>
                   <a:srgbClr val="7030A0"/>
                 </a:solidFill>
@@ -5706,7 +5684,7 @@
           <a:p>
             <a:pPr algn="ctr"/>
             <a:r>
-              <a:rPr lang="en-US" sz="1100" dirty="0" smtClean="0">
+              <a:rPr lang="en-US" sz="1100" dirty="0">
                 <a:solidFill>
                   <a:srgbClr val="7030A0"/>
                 </a:solidFill>
@@ -5745,7 +5723,7 @@
           <a:p>
             <a:pPr algn="ctr"/>
             <a:r>
-              <a:rPr lang="en-US" sz="1100" dirty="0" smtClean="0">
+              <a:rPr lang="en-US" sz="1100" dirty="0">
                 <a:solidFill>
                   <a:srgbClr val="7030A0"/>
                 </a:solidFill>
@@ -5784,7 +5762,7 @@
           <a:p>
             <a:pPr algn="ctr"/>
             <a:r>
-              <a:rPr lang="en-US" sz="1100" dirty="0" smtClean="0">
+              <a:rPr lang="en-US" sz="1100" dirty="0">
                 <a:solidFill>
                   <a:srgbClr val="7030A0"/>
                 </a:solidFill>
@@ -5823,7 +5801,7 @@
           <a:p>
             <a:pPr algn="ctr"/>
             <a:r>
-              <a:rPr lang="en-US" sz="1100" dirty="0" smtClean="0">
+              <a:rPr lang="en-US" sz="1100" dirty="0">
                 <a:solidFill>
                   <a:srgbClr val="7030A0"/>
                 </a:solidFill>
@@ -5862,7 +5840,7 @@
           <a:p>
             <a:pPr algn="ctr"/>
             <a:r>
-              <a:rPr lang="en-US" sz="1100" dirty="0" smtClean="0">
+              <a:rPr lang="en-US" sz="1100" dirty="0">
                 <a:solidFill>
                   <a:srgbClr val="7030A0"/>
                 </a:solidFill>
@@ -5901,7 +5879,826 @@
           <a:p>
             <a:pPr algn="ctr"/>
             <a:r>
-              <a:rPr lang="en-US" sz="1100" dirty="0" smtClean="0">
+              <a:rPr lang="en-US" sz="1100" dirty="0">
+                <a:solidFill>
+                  <a:srgbClr val="7030A0"/>
+                </a:solidFill>
+              </a:rPr>
+              <a:t>1</a:t>
+            </a:r>
+            <a:endParaRPr lang="en-SG" sz="1100" dirty="0">
+              <a:solidFill>
+                <a:srgbClr val="7030A0"/>
+              </a:solidFill>
+            </a:endParaRPr>
+          </a:p>
+        </p:txBody>
+      </p:sp>
+      <p:sp>
+        <p:nvSpPr>
+          <p:cNvPr id="55" name="Rectangle 8">
+            <a:extLst>
+              <a:ext uri="{FF2B5EF4-FFF2-40B4-BE49-F238E27FC236}">
+                <a16:creationId xmlns:a16="http://schemas.microsoft.com/office/drawing/2014/main" id="{C52930D5-2D4E-4EAB-942F-B1996501A7E5}"/>
+              </a:ext>
+            </a:extLst>
+          </p:cNvPr>
+          <p:cNvSpPr/>
+          <p:nvPr/>
+        </p:nvSpPr>
+        <p:spPr>
+          <a:xfrm>
+            <a:off x="4486258" y="1284614"/>
+            <a:ext cx="1156969" cy="346760"/>
+          </a:xfrm>
+          <a:prstGeom prst="rect">
+            <a:avLst/>
+          </a:prstGeom>
+          <a:ln w="19050">
+            <a:solidFill>
+              <a:srgbClr val="7030A0"/>
+            </a:solidFill>
+          </a:ln>
+          <a:effectLst/>
+        </p:spPr>
+        <p:style>
+          <a:lnRef idx="1">
+            <a:schemeClr val="accent4"/>
+          </a:lnRef>
+          <a:fillRef idx="2">
+            <a:schemeClr val="accent4"/>
+          </a:fillRef>
+          <a:effectRef idx="1">
+            <a:schemeClr val="accent4"/>
+          </a:effectRef>
+          <a:fontRef idx="minor">
+            <a:schemeClr val="dk1"/>
+          </a:fontRef>
+        </p:style>
+        <p:txBody>
+          <a:bodyPr rtlCol="0" anchor="ctr"/>
+          <a:lstStyle/>
+          <a:p>
+            <a:pPr algn="ctr"/>
+            <a:r>
+              <a:rPr lang="en-US" sz="1050" dirty="0" err="1">
+                <a:solidFill>
+                  <a:srgbClr val="7030A0"/>
+                </a:solidFill>
+              </a:rPr>
+              <a:t>UniqueGroupList</a:t>
+            </a:r>
+            <a:endParaRPr lang="en-SG" sz="1050" dirty="0">
+              <a:solidFill>
+                <a:srgbClr val="7030A0"/>
+              </a:solidFill>
+            </a:endParaRPr>
+          </a:p>
+        </p:txBody>
+      </p:sp>
+      <p:cxnSp>
+        <p:nvCxnSpPr>
+          <p:cNvPr id="73" name="Elbow Connector 58">
+            <a:extLst>
+              <a:ext uri="{FF2B5EF4-FFF2-40B4-BE49-F238E27FC236}">
+                <a16:creationId xmlns:a16="http://schemas.microsoft.com/office/drawing/2014/main" id="{963CD323-FBCA-4D7D-83AF-FC999B250F79}"/>
+              </a:ext>
+            </a:extLst>
+          </p:cNvPr>
+          <p:cNvCxnSpPr>
+            <a:cxnSpLocks/>
+            <a:stCxn id="51" idx="3"/>
+            <a:endCxn id="55" idx="1"/>
+          </p:cNvCxnSpPr>
+          <p:nvPr/>
+        </p:nvCxnSpPr>
+        <p:spPr>
+          <a:xfrm flipV="1">
+            <a:off x="4220351" y="1457994"/>
+            <a:ext cx="265907" cy="1302687"/>
+          </a:xfrm>
+          <a:prstGeom prst="bentConnector3">
+            <a:avLst>
+              <a:gd name="adj1" fmla="val 50000"/>
+            </a:avLst>
+          </a:prstGeom>
+          <a:ln w="19050">
+            <a:solidFill>
+              <a:srgbClr val="7030A0"/>
+            </a:solidFill>
+            <a:headEnd type="none" w="med" len="med"/>
+            <a:tailEnd type="arrow" w="med" len="med"/>
+          </a:ln>
+          <a:effectLst/>
+        </p:spPr>
+        <p:style>
+          <a:lnRef idx="1">
+            <a:schemeClr val="accent2"/>
+          </a:lnRef>
+          <a:fillRef idx="2">
+            <a:schemeClr val="accent2"/>
+          </a:fillRef>
+          <a:effectRef idx="1">
+            <a:schemeClr val="accent2"/>
+          </a:effectRef>
+          <a:fontRef idx="minor">
+            <a:schemeClr val="dk1"/>
+          </a:fontRef>
+        </p:style>
+      </p:cxnSp>
+      <p:sp>
+        <p:nvSpPr>
+          <p:cNvPr id="74" name="TextBox 73">
+            <a:extLst>
+              <a:ext uri="{FF2B5EF4-FFF2-40B4-BE49-F238E27FC236}">
+                <a16:creationId xmlns:a16="http://schemas.microsoft.com/office/drawing/2014/main" id="{5D8AB0D2-A296-4731-AEBE-99807A899331}"/>
+              </a:ext>
+            </a:extLst>
+          </p:cNvPr>
+          <p:cNvSpPr txBox="1"/>
+          <p:nvPr/>
+        </p:nvSpPr>
+        <p:spPr>
+          <a:xfrm>
+            <a:off x="4272723" y="1211980"/>
+            <a:ext cx="189257" cy="178683"/>
+          </a:xfrm>
+          <a:prstGeom prst="rect">
+            <a:avLst/>
+          </a:prstGeom>
+          <a:noFill/>
+        </p:spPr>
+        <p:txBody>
+          <a:bodyPr wrap="square" lIns="0" tIns="0" rIns="0" bIns="0" rtlCol="0">
+            <a:noAutofit/>
+          </a:bodyPr>
+          <a:lstStyle/>
+          <a:p>
+            <a:pPr algn="ctr"/>
+            <a:r>
+              <a:rPr lang="en-US" sz="1100" dirty="0">
+                <a:solidFill>
+                  <a:srgbClr val="7030A0"/>
+                </a:solidFill>
+              </a:rPr>
+              <a:t>1</a:t>
+            </a:r>
+            <a:endParaRPr lang="en-SG" sz="1100" dirty="0">
+              <a:solidFill>
+                <a:srgbClr val="7030A0"/>
+              </a:solidFill>
+            </a:endParaRPr>
+          </a:p>
+        </p:txBody>
+      </p:sp>
+      <p:sp>
+        <p:nvSpPr>
+          <p:cNvPr id="77" name="Rectangle 8">
+            <a:extLst>
+              <a:ext uri="{FF2B5EF4-FFF2-40B4-BE49-F238E27FC236}">
+                <a16:creationId xmlns:a16="http://schemas.microsoft.com/office/drawing/2014/main" id="{6A95435E-7B6C-4A74-AB4D-0047ECD0C6C3}"/>
+              </a:ext>
+            </a:extLst>
+          </p:cNvPr>
+          <p:cNvSpPr/>
+          <p:nvPr/>
+        </p:nvSpPr>
+        <p:spPr>
+          <a:xfrm>
+            <a:off x="5336104" y="818835"/>
+            <a:ext cx="759895" cy="346760"/>
+          </a:xfrm>
+          <a:prstGeom prst="rect">
+            <a:avLst/>
+          </a:prstGeom>
+          <a:ln w="19050">
+            <a:solidFill>
+              <a:srgbClr val="7030A0"/>
+            </a:solidFill>
+          </a:ln>
+          <a:effectLst/>
+        </p:spPr>
+        <p:style>
+          <a:lnRef idx="1">
+            <a:schemeClr val="accent4"/>
+          </a:lnRef>
+          <a:fillRef idx="2">
+            <a:schemeClr val="accent4"/>
+          </a:fillRef>
+          <a:effectRef idx="1">
+            <a:schemeClr val="accent4"/>
+          </a:effectRef>
+          <a:fontRef idx="minor">
+            <a:schemeClr val="dk1"/>
+          </a:fontRef>
+        </p:style>
+        <p:txBody>
+          <a:bodyPr rtlCol="0" anchor="ctr"/>
+          <a:lstStyle/>
+          <a:p>
+            <a:pPr algn="ctr"/>
+            <a:r>
+              <a:rPr lang="en-US" sz="1050" dirty="0">
+                <a:solidFill>
+                  <a:srgbClr val="7030A0"/>
+                </a:solidFill>
+              </a:rPr>
+              <a:t>Group</a:t>
+            </a:r>
+            <a:endParaRPr lang="en-SG" sz="1050" dirty="0">
+              <a:solidFill>
+                <a:srgbClr val="7030A0"/>
+              </a:solidFill>
+            </a:endParaRPr>
+          </a:p>
+        </p:txBody>
+      </p:sp>
+      <p:sp>
+        <p:nvSpPr>
+          <p:cNvPr id="82" name="Flowchart: Decision 96">
+            <a:extLst>
+              <a:ext uri="{FF2B5EF4-FFF2-40B4-BE49-F238E27FC236}">
+                <a16:creationId xmlns:a16="http://schemas.microsoft.com/office/drawing/2014/main" id="{506A4AC1-7C7E-4C89-AD72-BE7175F08B4B}"/>
+              </a:ext>
+            </a:extLst>
+          </p:cNvPr>
+          <p:cNvSpPr/>
+          <p:nvPr/>
+        </p:nvSpPr>
+        <p:spPr>
+          <a:xfrm rot="16200000">
+            <a:off x="4921666" y="1076043"/>
+            <a:ext cx="236048" cy="173380"/>
+          </a:xfrm>
+          <a:prstGeom prst="flowChartDecision">
+            <a:avLst/>
+          </a:prstGeom>
+          <a:noFill/>
+          <a:ln w="19050">
+            <a:solidFill>
+              <a:srgbClr val="7030A0"/>
+            </a:solidFill>
+          </a:ln>
+          <a:effectLst/>
+        </p:spPr>
+        <p:style>
+          <a:lnRef idx="1">
+            <a:schemeClr val="accent6"/>
+          </a:lnRef>
+          <a:fillRef idx="2">
+            <a:schemeClr val="accent6"/>
+          </a:fillRef>
+          <a:effectRef idx="1">
+            <a:schemeClr val="accent6"/>
+          </a:effectRef>
+          <a:fontRef idx="minor">
+            <a:schemeClr val="dk1"/>
+          </a:fontRef>
+        </p:style>
+        <p:txBody>
+          <a:bodyPr rtlCol="0" anchor="ctr"/>
+          <a:lstStyle/>
+          <a:p>
+            <a:pPr algn="ctr"/>
+            <a:endParaRPr lang="en-US" sz="1050"/>
+          </a:p>
+        </p:txBody>
+      </p:sp>
+      <p:cxnSp>
+        <p:nvCxnSpPr>
+          <p:cNvPr id="87" name="Elbow Connector 68">
+            <a:extLst>
+              <a:ext uri="{FF2B5EF4-FFF2-40B4-BE49-F238E27FC236}">
+                <a16:creationId xmlns:a16="http://schemas.microsoft.com/office/drawing/2014/main" id="{3026EC45-8139-47CA-A4A5-8E3CF2F725EA}"/>
+              </a:ext>
+            </a:extLst>
+          </p:cNvPr>
+          <p:cNvCxnSpPr>
+            <a:cxnSpLocks/>
+            <a:stCxn id="82" idx="3"/>
+            <a:endCxn id="77" idx="1"/>
+          </p:cNvCxnSpPr>
+          <p:nvPr/>
+        </p:nvCxnSpPr>
+        <p:spPr>
+          <a:xfrm rot="5400000" flipH="1" flipV="1">
+            <a:off x="5161650" y="870255"/>
+            <a:ext cx="52494" cy="296414"/>
+          </a:xfrm>
+          <a:prstGeom prst="bentConnector2">
+            <a:avLst/>
+          </a:prstGeom>
+          <a:ln w="19050">
+            <a:solidFill>
+              <a:srgbClr val="7030A0"/>
+            </a:solidFill>
+            <a:headEnd type="none" w="med" len="med"/>
+            <a:tailEnd type="arrow" w="med" len="med"/>
+          </a:ln>
+          <a:effectLst/>
+        </p:spPr>
+        <p:style>
+          <a:lnRef idx="1">
+            <a:schemeClr val="accent2"/>
+          </a:lnRef>
+          <a:fillRef idx="2">
+            <a:schemeClr val="accent2"/>
+          </a:fillRef>
+          <a:effectRef idx="1">
+            <a:schemeClr val="accent2"/>
+          </a:effectRef>
+          <a:fontRef idx="minor">
+            <a:schemeClr val="dk1"/>
+          </a:fontRef>
+        </p:style>
+      </p:cxnSp>
+      <p:sp>
+        <p:nvSpPr>
+          <p:cNvPr id="88" name="TextBox 87">
+            <a:extLst>
+              <a:ext uri="{FF2B5EF4-FFF2-40B4-BE49-F238E27FC236}">
+                <a16:creationId xmlns:a16="http://schemas.microsoft.com/office/drawing/2014/main" id="{9A6FD142-3BFB-4EBD-ACC4-00F4591E6323}"/>
+              </a:ext>
+            </a:extLst>
+          </p:cNvPr>
+          <p:cNvSpPr txBox="1"/>
+          <p:nvPr/>
+        </p:nvSpPr>
+        <p:spPr>
+          <a:xfrm>
+            <a:off x="5163172" y="788422"/>
+            <a:ext cx="189257" cy="178683"/>
+          </a:xfrm>
+          <a:prstGeom prst="rect">
+            <a:avLst/>
+          </a:prstGeom>
+          <a:noFill/>
+        </p:spPr>
+        <p:txBody>
+          <a:bodyPr wrap="square" lIns="0" tIns="0" rIns="0" bIns="0" rtlCol="0">
+            <a:noAutofit/>
+          </a:bodyPr>
+          <a:lstStyle/>
+          <a:p>
+            <a:pPr algn="ctr"/>
+            <a:r>
+              <a:rPr lang="en-US" sz="1100" dirty="0">
+                <a:solidFill>
+                  <a:srgbClr val="7030A0"/>
+                </a:solidFill>
+              </a:rPr>
+              <a:t>*</a:t>
+            </a:r>
+            <a:endParaRPr lang="en-SG" sz="1100" dirty="0">
+              <a:solidFill>
+                <a:srgbClr val="7030A0"/>
+              </a:solidFill>
+            </a:endParaRPr>
+          </a:p>
+        </p:txBody>
+      </p:sp>
+      <p:cxnSp>
+        <p:nvCxnSpPr>
+          <p:cNvPr id="89" name="Elbow Connector 49">
+            <a:extLst>
+              <a:ext uri="{FF2B5EF4-FFF2-40B4-BE49-F238E27FC236}">
+                <a16:creationId xmlns:a16="http://schemas.microsoft.com/office/drawing/2014/main" id="{703857C3-8DED-4F85-B8BA-1E6A045B27DC}"/>
+              </a:ext>
+            </a:extLst>
+          </p:cNvPr>
+          <p:cNvCxnSpPr>
+            <a:cxnSpLocks/>
+            <a:stCxn id="62" idx="0"/>
+            <a:endCxn id="77" idx="3"/>
+          </p:cNvCxnSpPr>
+          <p:nvPr/>
+        </p:nvCxnSpPr>
+        <p:spPr>
+          <a:xfrm rot="16200000" flipV="1">
+            <a:off x="5448960" y="1639255"/>
+            <a:ext cx="1865851" cy="571771"/>
+          </a:xfrm>
+          <a:prstGeom prst="bentConnector2">
+            <a:avLst/>
+          </a:prstGeom>
+          <a:ln w="19050">
+            <a:solidFill>
+              <a:srgbClr val="7030A0"/>
+            </a:solidFill>
+            <a:headEnd type="none" w="med" len="med"/>
+            <a:tailEnd type="arrow" w="med" len="med"/>
+          </a:ln>
+          <a:effectLst/>
+        </p:spPr>
+        <p:style>
+          <a:lnRef idx="1">
+            <a:schemeClr val="accent2"/>
+          </a:lnRef>
+          <a:fillRef idx="2">
+            <a:schemeClr val="accent2"/>
+          </a:fillRef>
+          <a:effectRef idx="1">
+            <a:schemeClr val="accent2"/>
+          </a:effectRef>
+          <a:fontRef idx="minor">
+            <a:schemeClr val="dk1"/>
+          </a:fontRef>
+        </p:style>
+      </p:cxnSp>
+      <p:sp>
+        <p:nvSpPr>
+          <p:cNvPr id="90" name="TextBox 89">
+            <a:extLst>
+              <a:ext uri="{FF2B5EF4-FFF2-40B4-BE49-F238E27FC236}">
+                <a16:creationId xmlns:a16="http://schemas.microsoft.com/office/drawing/2014/main" id="{BBCF30A6-7923-483A-84E3-A528A7F7E47B}"/>
+              </a:ext>
+            </a:extLst>
+          </p:cNvPr>
+          <p:cNvSpPr txBox="1"/>
+          <p:nvPr/>
+        </p:nvSpPr>
+        <p:spPr>
+          <a:xfrm>
+            <a:off x="6095969" y="1046421"/>
+            <a:ext cx="189257" cy="178683"/>
+          </a:xfrm>
+          <a:prstGeom prst="rect">
+            <a:avLst/>
+          </a:prstGeom>
+          <a:noFill/>
+        </p:spPr>
+        <p:txBody>
+          <a:bodyPr wrap="square" lIns="0" tIns="0" rIns="0" bIns="0" rtlCol="0">
+            <a:noAutofit/>
+          </a:bodyPr>
+          <a:lstStyle/>
+          <a:p>
+            <a:pPr algn="ctr"/>
+            <a:r>
+              <a:rPr lang="en-US" sz="1100" dirty="0">
+                <a:solidFill>
+                  <a:srgbClr val="7030A0"/>
+                </a:solidFill>
+              </a:rPr>
+              <a:t>1</a:t>
+            </a:r>
+            <a:endParaRPr lang="en-SG" sz="1100" dirty="0">
+              <a:solidFill>
+                <a:srgbClr val="7030A0"/>
+              </a:solidFill>
+            </a:endParaRPr>
+          </a:p>
+        </p:txBody>
+      </p:sp>
+      <p:sp>
+        <p:nvSpPr>
+          <p:cNvPr id="91" name="Rectangle 8">
+            <a:extLst>
+              <a:ext uri="{FF2B5EF4-FFF2-40B4-BE49-F238E27FC236}">
+                <a16:creationId xmlns:a16="http://schemas.microsoft.com/office/drawing/2014/main" id="{30A71FCC-9E6B-464F-9E96-3DD4D8BB4A76}"/>
+              </a:ext>
+            </a:extLst>
+          </p:cNvPr>
+          <p:cNvSpPr/>
+          <p:nvPr/>
+        </p:nvSpPr>
+        <p:spPr>
+          <a:xfrm>
+            <a:off x="7463985" y="1607845"/>
+            <a:ext cx="898203" cy="285783"/>
+          </a:xfrm>
+          <a:prstGeom prst="rect">
+            <a:avLst/>
+          </a:prstGeom>
+          <a:ln w="19050">
+            <a:solidFill>
+              <a:srgbClr val="7030A0"/>
+            </a:solidFill>
+          </a:ln>
+          <a:effectLst/>
+        </p:spPr>
+        <p:style>
+          <a:lnRef idx="1">
+            <a:schemeClr val="accent4"/>
+          </a:lnRef>
+          <a:fillRef idx="2">
+            <a:schemeClr val="accent4"/>
+          </a:fillRef>
+          <a:effectRef idx="1">
+            <a:schemeClr val="accent4"/>
+          </a:effectRef>
+          <a:fontRef idx="minor">
+            <a:schemeClr val="dk1"/>
+          </a:fontRef>
+        </p:style>
+        <p:txBody>
+          <a:bodyPr rtlCol="0" anchor="ctr"/>
+          <a:lstStyle/>
+          <a:p>
+            <a:pPr algn="ctr"/>
+            <a:r>
+              <a:rPr lang="en-US" sz="1050" dirty="0" err="1">
+                <a:solidFill>
+                  <a:srgbClr val="7030A0"/>
+                </a:solidFill>
+              </a:rPr>
+              <a:t>CustomField</a:t>
+            </a:r>
+            <a:endParaRPr lang="en-SG" sz="1050" dirty="0">
+              <a:solidFill>
+                <a:srgbClr val="7030A0"/>
+              </a:solidFill>
+            </a:endParaRPr>
+          </a:p>
+        </p:txBody>
+      </p:sp>
+      <p:sp>
+        <p:nvSpPr>
+          <p:cNvPr id="92" name="Rectangle 8">
+            <a:extLst>
+              <a:ext uri="{FF2B5EF4-FFF2-40B4-BE49-F238E27FC236}">
+                <a16:creationId xmlns:a16="http://schemas.microsoft.com/office/drawing/2014/main" id="{4709184C-CD09-4A0B-8700-E81553812A8D}"/>
+              </a:ext>
+            </a:extLst>
+          </p:cNvPr>
+          <p:cNvSpPr/>
+          <p:nvPr/>
+        </p:nvSpPr>
+        <p:spPr>
+          <a:xfrm>
+            <a:off x="7349983" y="839246"/>
+            <a:ext cx="1156969" cy="305938"/>
+          </a:xfrm>
+          <a:prstGeom prst="rect">
+            <a:avLst/>
+          </a:prstGeom>
+          <a:ln w="19050">
+            <a:solidFill>
+              <a:srgbClr val="7030A0"/>
+            </a:solidFill>
+          </a:ln>
+          <a:effectLst/>
+        </p:spPr>
+        <p:style>
+          <a:lnRef idx="1">
+            <a:schemeClr val="accent4"/>
+          </a:lnRef>
+          <a:fillRef idx="2">
+            <a:schemeClr val="accent4"/>
+          </a:fillRef>
+          <a:effectRef idx="1">
+            <a:schemeClr val="accent4"/>
+          </a:effectRef>
+          <a:fontRef idx="minor">
+            <a:schemeClr val="dk1"/>
+          </a:fontRef>
+        </p:style>
+        <p:txBody>
+          <a:bodyPr rtlCol="0" anchor="ctr"/>
+          <a:lstStyle/>
+          <a:p>
+            <a:pPr algn="ctr"/>
+            <a:r>
+              <a:rPr lang="en-US" sz="1050" dirty="0" err="1">
+                <a:solidFill>
+                  <a:srgbClr val="7030A0"/>
+                </a:solidFill>
+              </a:rPr>
+              <a:t>CustomFieldList</a:t>
+            </a:r>
+            <a:endParaRPr lang="en-SG" sz="1050" dirty="0">
+              <a:solidFill>
+                <a:srgbClr val="7030A0"/>
+              </a:solidFill>
+            </a:endParaRPr>
+          </a:p>
+        </p:txBody>
+      </p:sp>
+      <p:sp>
+        <p:nvSpPr>
+          <p:cNvPr id="105" name="Flowchart: Decision 96">
+            <a:extLst>
+              <a:ext uri="{FF2B5EF4-FFF2-40B4-BE49-F238E27FC236}">
+                <a16:creationId xmlns:a16="http://schemas.microsoft.com/office/drawing/2014/main" id="{F278F66F-6F61-4A7E-9CE5-13335116721F}"/>
+              </a:ext>
+            </a:extLst>
+          </p:cNvPr>
+          <p:cNvSpPr/>
+          <p:nvPr/>
+        </p:nvSpPr>
+        <p:spPr>
+          <a:xfrm rot="16200000">
+            <a:off x="7798031" y="1187625"/>
+            <a:ext cx="236048" cy="173380"/>
+          </a:xfrm>
+          <a:prstGeom prst="flowChartDecision">
+            <a:avLst/>
+          </a:prstGeom>
+          <a:noFill/>
+          <a:ln w="19050">
+            <a:solidFill>
+              <a:srgbClr val="7030A0"/>
+            </a:solidFill>
+          </a:ln>
+          <a:effectLst/>
+        </p:spPr>
+        <p:style>
+          <a:lnRef idx="1">
+            <a:schemeClr val="accent6"/>
+          </a:lnRef>
+          <a:fillRef idx="2">
+            <a:schemeClr val="accent6"/>
+          </a:fillRef>
+          <a:effectRef idx="1">
+            <a:schemeClr val="accent6"/>
+          </a:effectRef>
+          <a:fontRef idx="minor">
+            <a:schemeClr val="dk1"/>
+          </a:fontRef>
+        </p:style>
+        <p:txBody>
+          <a:bodyPr rtlCol="0" anchor="ctr"/>
+          <a:lstStyle/>
+          <a:p>
+            <a:pPr algn="ctr"/>
+            <a:endParaRPr lang="en-US" sz="1050"/>
+          </a:p>
+        </p:txBody>
+      </p:sp>
+      <p:cxnSp>
+        <p:nvCxnSpPr>
+          <p:cNvPr id="106" name="Elbow Connector 68">
+            <a:extLst>
+              <a:ext uri="{FF2B5EF4-FFF2-40B4-BE49-F238E27FC236}">
+                <a16:creationId xmlns:a16="http://schemas.microsoft.com/office/drawing/2014/main" id="{CB98FAE4-3505-47A9-BF56-C15105EDA66A}"/>
+              </a:ext>
+            </a:extLst>
+          </p:cNvPr>
+          <p:cNvCxnSpPr>
+            <a:cxnSpLocks/>
+            <a:stCxn id="105" idx="1"/>
+            <a:endCxn id="91" idx="0"/>
+          </p:cNvCxnSpPr>
+          <p:nvPr/>
+        </p:nvCxnSpPr>
+        <p:spPr>
+          <a:xfrm rot="5400000">
+            <a:off x="7806818" y="1498608"/>
+            <a:ext cx="215506" cy="2968"/>
+          </a:xfrm>
+          <a:prstGeom prst="bentConnector3">
+            <a:avLst>
+              <a:gd name="adj1" fmla="val 50000"/>
+            </a:avLst>
+          </a:prstGeom>
+          <a:ln w="19050">
+            <a:solidFill>
+              <a:srgbClr val="7030A0"/>
+            </a:solidFill>
+            <a:headEnd type="none" w="med" len="med"/>
+            <a:tailEnd type="arrow" w="med" len="med"/>
+          </a:ln>
+          <a:effectLst/>
+        </p:spPr>
+        <p:style>
+          <a:lnRef idx="1">
+            <a:schemeClr val="accent2"/>
+          </a:lnRef>
+          <a:fillRef idx="2">
+            <a:schemeClr val="accent2"/>
+          </a:fillRef>
+          <a:effectRef idx="1">
+            <a:schemeClr val="accent2"/>
+          </a:effectRef>
+          <a:fontRef idx="minor">
+            <a:schemeClr val="dk1"/>
+          </a:fontRef>
+        </p:style>
+      </p:cxnSp>
+      <p:sp>
+        <p:nvSpPr>
+          <p:cNvPr id="108" name="TextBox 107">
+            <a:extLst>
+              <a:ext uri="{FF2B5EF4-FFF2-40B4-BE49-F238E27FC236}">
+                <a16:creationId xmlns:a16="http://schemas.microsoft.com/office/drawing/2014/main" id="{F59A5A59-AF35-40DA-BF28-6B5952453E77}"/>
+              </a:ext>
+            </a:extLst>
+          </p:cNvPr>
+          <p:cNvSpPr txBox="1"/>
+          <p:nvPr/>
+        </p:nvSpPr>
+        <p:spPr>
+          <a:xfrm>
+            <a:off x="7723829" y="1389553"/>
+            <a:ext cx="189257" cy="178683"/>
+          </a:xfrm>
+          <a:prstGeom prst="rect">
+            <a:avLst/>
+          </a:prstGeom>
+          <a:noFill/>
+        </p:spPr>
+        <p:txBody>
+          <a:bodyPr wrap="square" lIns="0" tIns="0" rIns="0" bIns="0" rtlCol="0">
+            <a:noAutofit/>
+          </a:bodyPr>
+          <a:lstStyle/>
+          <a:p>
+            <a:pPr algn="ctr"/>
+            <a:r>
+              <a:rPr lang="en-US" sz="1100" dirty="0">
+                <a:solidFill>
+                  <a:srgbClr val="7030A0"/>
+                </a:solidFill>
+              </a:rPr>
+              <a:t>*</a:t>
+            </a:r>
+            <a:endParaRPr lang="en-SG" sz="1100" dirty="0">
+              <a:solidFill>
+                <a:srgbClr val="7030A0"/>
+              </a:solidFill>
+            </a:endParaRPr>
+          </a:p>
+        </p:txBody>
+      </p:sp>
+      <p:cxnSp>
+        <p:nvCxnSpPr>
+          <p:cNvPr id="110" name="Elbow Connector 85">
+            <a:extLst>
+              <a:ext uri="{FF2B5EF4-FFF2-40B4-BE49-F238E27FC236}">
+                <a16:creationId xmlns:a16="http://schemas.microsoft.com/office/drawing/2014/main" id="{E616325A-B6F3-4BD2-832F-967B01FDD06D}"/>
+              </a:ext>
+            </a:extLst>
+          </p:cNvPr>
+          <p:cNvCxnSpPr>
+            <a:cxnSpLocks/>
+            <a:stCxn id="62" idx="0"/>
+            <a:endCxn id="92" idx="1"/>
+          </p:cNvCxnSpPr>
+          <p:nvPr/>
+        </p:nvCxnSpPr>
+        <p:spPr>
+          <a:xfrm rot="5400000" flipH="1" flipV="1">
+            <a:off x="6075951" y="1584035"/>
+            <a:ext cx="1865851" cy="682213"/>
+          </a:xfrm>
+          <a:prstGeom prst="bentConnector2">
+            <a:avLst/>
+          </a:prstGeom>
+          <a:ln w="19050">
+            <a:solidFill>
+              <a:srgbClr val="7030A0"/>
+            </a:solidFill>
+            <a:headEnd type="none" w="med" len="med"/>
+            <a:tailEnd type="arrow" w="med" len="med"/>
+          </a:ln>
+          <a:effectLst/>
+        </p:spPr>
+        <p:style>
+          <a:lnRef idx="1">
+            <a:schemeClr val="accent2"/>
+          </a:lnRef>
+          <a:fillRef idx="2">
+            <a:schemeClr val="accent2"/>
+          </a:fillRef>
+          <a:effectRef idx="1">
+            <a:schemeClr val="accent2"/>
+          </a:effectRef>
+          <a:fontRef idx="minor">
+            <a:schemeClr val="dk1"/>
+          </a:fontRef>
+        </p:style>
+      </p:cxnSp>
+      <p:sp>
+        <p:nvSpPr>
+          <p:cNvPr id="93" name="TextBox 92">
+            <a:extLst>
+              <a:ext uri="{FF2B5EF4-FFF2-40B4-BE49-F238E27FC236}">
+                <a16:creationId xmlns:a16="http://schemas.microsoft.com/office/drawing/2014/main" id="{A288A858-C5E6-424F-9670-9CDC3C47388A}"/>
+              </a:ext>
+            </a:extLst>
+          </p:cNvPr>
+          <p:cNvSpPr txBox="1"/>
+          <p:nvPr/>
+        </p:nvSpPr>
+        <p:spPr>
+          <a:xfrm>
+            <a:off x="7131572" y="1046421"/>
+            <a:ext cx="189257" cy="178683"/>
+          </a:xfrm>
+          <a:prstGeom prst="rect">
+            <a:avLst/>
+          </a:prstGeom>
+          <a:noFill/>
+        </p:spPr>
+        <p:txBody>
+          <a:bodyPr wrap="square" lIns="0" tIns="0" rIns="0" bIns="0" rtlCol="0">
+            <a:noAutofit/>
+          </a:bodyPr>
+          <a:lstStyle/>
+          <a:p>
+            <a:pPr algn="ctr"/>
+            <a:r>
+              <a:rPr lang="en-US" sz="1100" dirty="0">
                 <a:solidFill>
                   <a:srgbClr val="7030A0"/>
                 </a:solidFill>
@@ -5926,13 +6723,6 @@
   <p:clrMapOvr>
     <a:masterClrMapping/>
   </p:clrMapOvr>
-  <p:timing>
-    <p:tnLst>
-      <p:par>
-        <p:cTn id="1" dur="indefinite" restart="never" nodeType="tmRoot"/>
-      </p:par>
-    </p:tnLst>
-  </p:timing>
 </p:sld>
 </file>
 

</xml_diff>